<commit_message>
inclusão de bola azul
</commit_message>
<xml_diff>
--- a/PastaDocumentosProjeto/Kickoff.pptx
+++ b/PastaDocumentosProjeto/Kickoff.pptx
@@ -104,6 +104,11 @@
       </a:defRPr>
     </a:lvl9pPr>
   </p:defaultTextStyle>
+  <p:extLst>
+    <p:ext uri="{EFAFB233-063F-42B5-8137-9DF3F51BA10A}">
+      <p15:sldGuideLst xmlns:p15="http://schemas.microsoft.com/office/powerpoint/2012/main"/>
+    </p:ext>
+  </p:extLst>
 </p:presentation>
 </file>
 
@@ -3389,6 +3394,56 @@
           </a:p>
         </p:txBody>
       </p:sp>
+      <p:sp>
+        <p:nvSpPr>
+          <p:cNvPr id="4" name="Star: 5 Points 3">
+            <a:extLst>
+              <a:ext uri="{FF2B5EF4-FFF2-40B4-BE49-F238E27FC236}">
+                <a16:creationId xmlns:a16="http://schemas.microsoft.com/office/drawing/2014/main" id="{E3BFCDB0-D7D2-4567-80FA-5022F507ABE1}"/>
+              </a:ext>
+            </a:extLst>
+          </p:cNvPr>
+          <p:cNvSpPr/>
+          <p:nvPr/>
+        </p:nvSpPr>
+        <p:spPr>
+          <a:xfrm>
+            <a:off x="3319976" y="936125"/>
+            <a:ext cx="4726744" cy="3634471"/>
+          </a:xfrm>
+          <a:prstGeom prst="star5">
+            <a:avLst>
+              <a:gd name="adj" fmla="val 30230"/>
+              <a:gd name="hf" fmla="val 105146"/>
+              <a:gd name="vf" fmla="val 110557"/>
+            </a:avLst>
+          </a:prstGeom>
+        </p:spPr>
+        <p:style>
+          <a:lnRef idx="2">
+            <a:schemeClr val="accent1">
+              <a:shade val="50000"/>
+            </a:schemeClr>
+          </a:lnRef>
+          <a:fillRef idx="1">
+            <a:schemeClr val="accent1"/>
+          </a:fillRef>
+          <a:effectRef idx="0">
+            <a:schemeClr val="accent1"/>
+          </a:effectRef>
+          <a:fontRef idx="minor">
+            <a:schemeClr val="lt1"/>
+          </a:fontRef>
+        </p:style>
+        <p:txBody>
+          <a:bodyPr rtlCol="0" anchor="ctr"/>
+          <a:lstStyle/>
+          <a:p>
+            <a:pPr algn="ctr"/>
+            <a:endParaRPr lang="en-US"/>
+          </a:p>
+        </p:txBody>
+      </p:sp>
     </p:spTree>
     <p:extLst>
       <p:ext uri="{BB962C8B-B14F-4D97-AF65-F5344CB8AC3E}">

</xml_diff>